<commit_message>
1) Dokończenie prezentacji. 2) Drobne poprawki w mojej części raportu.
</commit_message>
<xml_diff>
--- a/doc/prezentacje/mo3d_prezentacja2.pptx
+++ b/doc/prezentacje/mo3d_prezentacja2.pptx
@@ -5,7 +5,7 @@
     <p:sldMasterId id="2147483696" r:id="rId1"/>
   </p:sldMasterIdLst>
   <p:notesMasterIdLst>
-    <p:notesMasterId r:id="rId12"/>
+    <p:notesMasterId r:id="rId16"/>
   </p:notesMasterIdLst>
   <p:sldIdLst>
     <p:sldId id="256" r:id="rId2"/>
@@ -18,6 +18,10 @@
     <p:sldId id="269" r:id="rId9"/>
     <p:sldId id="271" r:id="rId10"/>
     <p:sldId id="272" r:id="rId11"/>
+    <p:sldId id="273" r:id="rId12"/>
+    <p:sldId id="274" r:id="rId13"/>
+    <p:sldId id="275" r:id="rId14"/>
+    <p:sldId id="276" r:id="rId15"/>
   </p:sldIdLst>
   <p:sldSz cx="9144000" cy="6858000" type="screen4x3"/>
   <p:notesSz cx="6858000" cy="9144000"/>
@@ -217,7 +221,7 @@
           <a:p>
             <a:fld id="{71BE02A5-DEA2-4BD3-B9D2-E8A21A7F61D7}" type="datetimeFigureOut">
               <a:rPr lang="pl-PL" smtClean="0"/>
-              <a:t>2015-05-05</a:t>
+              <a:t>2015-05-06</a:t>
             </a:fld>
             <a:endParaRPr lang="pl-PL"/>
           </a:p>
@@ -1022,7 +1026,7 @@
           <a:p>
             <a:fld id="{51004C8E-E9E8-43FB-A6B9-8659F2AE8AF4}" type="datetimeFigureOut">
               <a:rPr lang="pl-PL" smtClean="0"/>
-              <a:t>2015-05-05</a:t>
+              <a:t>2015-05-06</a:t>
             </a:fld>
             <a:endParaRPr lang="pl-PL"/>
           </a:p>
@@ -1235,7 +1239,7 @@
           <a:p>
             <a:fld id="{51004C8E-E9E8-43FB-A6B9-8659F2AE8AF4}" type="datetimeFigureOut">
               <a:rPr lang="pl-PL" smtClean="0"/>
-              <a:t>2015-05-05</a:t>
+              <a:t>2015-05-06</a:t>
             </a:fld>
             <a:endParaRPr lang="pl-PL"/>
           </a:p>
@@ -1502,7 +1506,7 @@
           <a:p>
             <a:fld id="{51004C8E-E9E8-43FB-A6B9-8659F2AE8AF4}" type="datetimeFigureOut">
               <a:rPr lang="pl-PL" smtClean="0"/>
-              <a:t>2015-05-05</a:t>
+              <a:t>2015-05-06</a:t>
             </a:fld>
             <a:endParaRPr lang="pl-PL"/>
           </a:p>
@@ -1652,7 +1656,7 @@
           <a:p>
             <a:fld id="{51004C8E-E9E8-43FB-A6B9-8659F2AE8AF4}" type="datetimeFigureOut">
               <a:rPr lang="pl-PL" smtClean="0"/>
-              <a:t>2015-05-05</a:t>
+              <a:t>2015-05-06</a:t>
             </a:fld>
             <a:endParaRPr lang="pl-PL"/>
           </a:p>
@@ -1982,7 +1986,7 @@
           <a:p>
             <a:fld id="{51004C8E-E9E8-43FB-A6B9-8659F2AE8AF4}" type="datetimeFigureOut">
               <a:rPr lang="pl-PL" smtClean="0"/>
-              <a:t>2015-05-05</a:t>
+              <a:t>2015-05-06</a:t>
             </a:fld>
             <a:endParaRPr lang="pl-PL"/>
           </a:p>
@@ -2290,7 +2294,7 @@
           <a:p>
             <a:fld id="{51004C8E-E9E8-43FB-A6B9-8659F2AE8AF4}" type="datetimeFigureOut">
               <a:rPr lang="pl-PL" smtClean="0"/>
-              <a:t>2015-05-05</a:t>
+              <a:t>2015-05-06</a:t>
             </a:fld>
             <a:endParaRPr lang="pl-PL"/>
           </a:p>
@@ -2711,7 +2715,7 @@
           <a:p>
             <a:fld id="{51004C8E-E9E8-43FB-A6B9-8659F2AE8AF4}" type="datetimeFigureOut">
               <a:rPr lang="pl-PL" smtClean="0"/>
-              <a:t>2015-05-05</a:t>
+              <a:t>2015-05-06</a:t>
             </a:fld>
             <a:endParaRPr lang="pl-PL"/>
           </a:p>
@@ -2824,7 +2828,7 @@
           <a:p>
             <a:fld id="{51004C8E-E9E8-43FB-A6B9-8659F2AE8AF4}" type="datetimeFigureOut">
               <a:rPr lang="pl-PL" smtClean="0"/>
-              <a:t>2015-05-05</a:t>
+              <a:t>2015-05-06</a:t>
             </a:fld>
             <a:endParaRPr lang="pl-PL"/>
           </a:p>
@@ -2983,7 +2987,7 @@
           <a:p>
             <a:fld id="{51004C8E-E9E8-43FB-A6B9-8659F2AE8AF4}" type="datetimeFigureOut">
               <a:rPr lang="pl-PL" smtClean="0"/>
-              <a:t>2015-05-05</a:t>
+              <a:t>2015-05-06</a:t>
             </a:fld>
             <a:endParaRPr lang="pl-PL"/>
           </a:p>
@@ -3367,7 +3371,7 @@
           <a:p>
             <a:fld id="{51004C8E-E9E8-43FB-A6B9-8659F2AE8AF4}" type="datetimeFigureOut">
               <a:rPr lang="pl-PL" smtClean="0"/>
-              <a:t>2015-05-05</a:t>
+              <a:t>2015-05-06</a:t>
             </a:fld>
             <a:endParaRPr lang="pl-PL"/>
           </a:p>
@@ -3729,7 +3733,7 @@
           <a:p>
             <a:fld id="{51004C8E-E9E8-43FB-A6B9-8659F2AE8AF4}" type="datetimeFigureOut">
               <a:rPr lang="pl-PL" smtClean="0"/>
-              <a:t>2015-05-05</a:t>
+              <a:t>2015-05-06</a:t>
             </a:fld>
             <a:endParaRPr lang="pl-PL"/>
           </a:p>
@@ -4063,7 +4067,7 @@
           <a:p>
             <a:fld id="{51004C8E-E9E8-43FB-A6B9-8659F2AE8AF4}" type="datetimeFigureOut">
               <a:rPr lang="pl-PL" smtClean="0"/>
-              <a:t>2015-05-05</a:t>
+              <a:t>2015-05-06</a:t>
             </a:fld>
             <a:endParaRPr lang="pl-PL"/>
           </a:p>
@@ -4534,11 +4538,7 @@
             <a:pPr algn="ctr"/>
             <a:r>
               <a:rPr lang="pl-PL" sz="2800" dirty="0" smtClean="0"/>
-              <a:t>„Symulator wyścigów powietrznych w dowolnej scenerii wygenerowanej z mapy wysokościowej terenu</a:t>
-            </a:r>
-            <a:r>
-              <a:rPr lang="pl-PL" sz="2800" dirty="0" smtClean="0"/>
-              <a:t>.”</a:t>
+              <a:t>„Symulator wyścigów powietrznych w dowolnej scenerii wygenerowanej z mapy wysokościowej terenu.”</a:t>
             </a:r>
             <a:br>
               <a:rPr lang="pl-PL" sz="2800" dirty="0" smtClean="0"/>
@@ -4612,32 +4612,32 @@
           </a:xfrm>
         </p:spPr>
         <p:txBody>
-          <a:bodyPr/>
-          <a:lstStyle/>
-          <a:p>
-            <a:endParaRPr lang="pl-PL" dirty="0" smtClean="0"/>
-          </a:p>
+          <a:bodyPr>
+            <a:normAutofit/>
+          </a:bodyPr>
+          <a:lstStyle/>
           <a:p>
             <a:pPr marL="45720" indent="0">
               <a:buNone/>
             </a:pPr>
             <a:r>
-              <a:rPr lang="pl-PL" dirty="0" smtClean="0"/>
-              <a:t>Dlatego też do przedstawienia zrealizowanej dotychczas symulacji wstawiliśmy utworzony statycznie w edytorze teren, a poniżej </a:t>
-            </a:r>
-            <a:r>
-              <a:rPr lang="pl-PL" dirty="0" err="1" smtClean="0"/>
-              <a:t>screeny</a:t>
-            </a:r>
-            <a:r>
-              <a:rPr lang="pl-PL" dirty="0" smtClean="0"/>
-              <a:t> z utworzonej </a:t>
-            </a:r>
-            <a:r>
-              <a:rPr lang="pl-PL" smtClean="0"/>
-              <a:t>dotychczas symulacji:</a:t>
-            </a:r>
-            <a:endParaRPr lang="pl-PL" dirty="0" smtClean="0"/>
+              <a:rPr lang="pl-PL" sz="1800" dirty="0"/>
+              <a:t>Do utworzonego terenu dodaliśmy losowo umieszczane drzewa i do sceny wstawiliśmy efekt wiatru. Następnie wstawiliśmy model samolotu, możliwość poruszania nim i różne rodzaje widoku, w pierwszej kolejności widok z perspektywy </a:t>
+            </a:r>
+            <a:r>
+              <a:rPr lang="pl-PL" sz="1800" dirty="0" smtClean="0"/>
+              <a:t>samolotu</a:t>
+            </a:r>
+            <a:r>
+              <a:rPr lang="pl-PL" sz="1800" dirty="0" smtClean="0"/>
+              <a:t>:</a:t>
+            </a:r>
+          </a:p>
+          <a:p>
+            <a:pPr marL="45720" indent="0">
+              <a:buNone/>
+            </a:pPr>
+            <a:endParaRPr lang="pl-PL" sz="1800" dirty="0" smtClean="0"/>
           </a:p>
         </p:txBody>
       </p:sp>
@@ -4664,10 +4664,487 @@
           </a:p>
         </p:txBody>
       </p:sp>
+      <p:pic>
+        <p:nvPicPr>
+          <p:cNvPr id="5" name="Obraz 4"/>
+          <p:cNvPicPr>
+            <a:picLocks noChangeAspect="1"/>
+          </p:cNvPicPr>
+          <p:nvPr/>
+        </p:nvPicPr>
+        <p:blipFill>
+          <a:blip r:embed="rId2"/>
+          <a:stretch>
+            <a:fillRect/>
+          </a:stretch>
+        </p:blipFill>
+        <p:spPr>
+          <a:xfrm>
+            <a:off x="1907704" y="2924944"/>
+            <a:ext cx="5472608" cy="3606750"/>
+          </a:xfrm>
+          <a:prstGeom prst="rect">
+            <a:avLst/>
+          </a:prstGeom>
+        </p:spPr>
+      </p:pic>
     </p:spTree>
     <p:extLst>
       <p:ext uri="{BB962C8B-B14F-4D97-AF65-F5344CB8AC3E}">
         <p14:creationId xmlns:p14="http://schemas.microsoft.com/office/powerpoint/2010/main" val="758791059"/>
+      </p:ext>
+    </p:extLst>
+  </p:cSld>
+  <p:clrMapOvr>
+    <a:masterClrMapping/>
+  </p:clrMapOvr>
+  <p:timing>
+    <p:tnLst>
+      <p:par>
+        <p:cTn id="1" dur="indefinite" restart="never" nodeType="tmRoot"/>
+      </p:par>
+    </p:tnLst>
+  </p:timing>
+</p:sld>
+</file>
+
+<file path=ppt/slides/slide11.xml><?xml version="1.0" encoding="utf-8"?>
+<p:sld xmlns:a="http://schemas.openxmlformats.org/drawingml/2006/main" xmlns:r="http://schemas.openxmlformats.org/officeDocument/2006/relationships" xmlns:p="http://schemas.openxmlformats.org/presentationml/2006/main">
+  <p:cSld>
+    <p:spTree>
+      <p:nvGrpSpPr>
+        <p:cNvPr id="1" name=""/>
+        <p:cNvGrpSpPr/>
+        <p:nvPr/>
+      </p:nvGrpSpPr>
+      <p:grpSpPr>
+        <a:xfrm>
+          <a:off x="0" y="0"/>
+          <a:ext cx="0" cy="0"/>
+          <a:chOff x="0" y="0"/>
+          <a:chExt cx="0" cy="0"/>
+        </a:xfrm>
+      </p:grpSpPr>
+      <p:sp>
+        <p:nvSpPr>
+          <p:cNvPr id="3" name="Symbol zastępczy zawartości 2"/>
+          <p:cNvSpPr>
+            <a:spLocks noGrp="1"/>
+          </p:cNvSpPr>
+          <p:nvPr>
+            <p:ph idx="1"/>
+          </p:nvPr>
+        </p:nvSpPr>
+        <p:spPr>
+          <a:xfrm>
+            <a:off x="380999" y="1719070"/>
+            <a:ext cx="8407893" cy="4878281"/>
+          </a:xfrm>
+        </p:spPr>
+        <p:txBody>
+          <a:bodyPr>
+            <a:normAutofit/>
+          </a:bodyPr>
+          <a:lstStyle/>
+          <a:p>
+            <a:pPr marL="45720" indent="0">
+              <a:buNone/>
+            </a:pPr>
+            <a:r>
+              <a:rPr lang="pl-PL" sz="1800" dirty="0"/>
+              <a:t>Widok z tyłu samolotu oraz z boku</a:t>
+            </a:r>
+            <a:r>
+              <a:rPr lang="pl-PL" sz="1800" dirty="0" smtClean="0"/>
+              <a:t>:</a:t>
+            </a:r>
+          </a:p>
+          <a:p>
+            <a:pPr marL="45720" indent="0">
+              <a:buNone/>
+            </a:pPr>
+            <a:endParaRPr lang="pl-PL" sz="1800" dirty="0" smtClean="0"/>
+          </a:p>
+        </p:txBody>
+      </p:sp>
+      <p:sp>
+        <p:nvSpPr>
+          <p:cNvPr id="2" name="Tytuł 1"/>
+          <p:cNvSpPr>
+            <a:spLocks noGrp="1"/>
+          </p:cNvSpPr>
+          <p:nvPr>
+            <p:ph type="title"/>
+          </p:nvPr>
+        </p:nvSpPr>
+        <p:spPr/>
+        <p:txBody>
+          <a:bodyPr/>
+          <a:lstStyle/>
+          <a:p>
+            <a:r>
+              <a:rPr lang="pl-PL" dirty="0" smtClean="0"/>
+              <a:t>Postęp prac</a:t>
+            </a:r>
+            <a:endParaRPr lang="pl-PL" dirty="0"/>
+          </a:p>
+        </p:txBody>
+      </p:sp>
+      <p:pic>
+        <p:nvPicPr>
+          <p:cNvPr id="7" name="Obraz 6"/>
+          <p:cNvPicPr>
+            <a:picLocks noChangeAspect="1"/>
+          </p:cNvPicPr>
+          <p:nvPr/>
+        </p:nvPicPr>
+        <p:blipFill>
+          <a:blip r:embed="rId2"/>
+          <a:stretch>
+            <a:fillRect/>
+          </a:stretch>
+        </p:blipFill>
+        <p:spPr>
+          <a:xfrm>
+            <a:off x="2639632" y="2077937"/>
+            <a:ext cx="6245947" cy="4160545"/>
+          </a:xfrm>
+          <a:prstGeom prst="rect">
+            <a:avLst/>
+          </a:prstGeom>
+        </p:spPr>
+      </p:pic>
+      <p:pic>
+        <p:nvPicPr>
+          <p:cNvPr id="4" name="Obraz 3"/>
+          <p:cNvPicPr>
+            <a:picLocks noChangeAspect="1"/>
+          </p:cNvPicPr>
+          <p:nvPr/>
+        </p:nvPicPr>
+        <p:blipFill>
+          <a:blip r:embed="rId3"/>
+          <a:stretch>
+            <a:fillRect/>
+          </a:stretch>
+        </p:blipFill>
+        <p:spPr>
+          <a:xfrm>
+            <a:off x="251520" y="3645024"/>
+            <a:ext cx="4488643" cy="2952327"/>
+          </a:xfrm>
+          <a:prstGeom prst="rect">
+            <a:avLst/>
+          </a:prstGeom>
+        </p:spPr>
+      </p:pic>
+    </p:spTree>
+    <p:extLst>
+      <p:ext uri="{BB962C8B-B14F-4D97-AF65-F5344CB8AC3E}">
+        <p14:creationId xmlns:p14="http://schemas.microsoft.com/office/powerpoint/2010/main" val="46333594"/>
+      </p:ext>
+    </p:extLst>
+  </p:cSld>
+  <p:clrMapOvr>
+    <a:masterClrMapping/>
+  </p:clrMapOvr>
+  <p:timing>
+    <p:tnLst>
+      <p:par>
+        <p:cTn id="1" dur="indefinite" restart="never" nodeType="tmRoot"/>
+      </p:par>
+    </p:tnLst>
+  </p:timing>
+</p:sld>
+</file>
+
+<file path=ppt/slides/slide12.xml><?xml version="1.0" encoding="utf-8"?>
+<p:sld xmlns:a="http://schemas.openxmlformats.org/drawingml/2006/main" xmlns:r="http://schemas.openxmlformats.org/officeDocument/2006/relationships" xmlns:p="http://schemas.openxmlformats.org/presentationml/2006/main">
+  <p:cSld>
+    <p:spTree>
+      <p:nvGrpSpPr>
+        <p:cNvPr id="1" name=""/>
+        <p:cNvGrpSpPr/>
+        <p:nvPr/>
+      </p:nvGrpSpPr>
+      <p:grpSpPr>
+        <a:xfrm>
+          <a:off x="0" y="0"/>
+          <a:ext cx="0" cy="0"/>
+          <a:chOff x="0" y="0"/>
+          <a:chExt cx="0" cy="0"/>
+        </a:xfrm>
+      </p:grpSpPr>
+      <p:sp>
+        <p:nvSpPr>
+          <p:cNvPr id="3" name="Symbol zastępczy zawartości 2"/>
+          <p:cNvSpPr>
+            <a:spLocks noGrp="1"/>
+          </p:cNvSpPr>
+          <p:nvPr>
+            <p:ph idx="1"/>
+          </p:nvPr>
+        </p:nvSpPr>
+        <p:spPr>
+          <a:xfrm>
+            <a:off x="380999" y="1719070"/>
+            <a:ext cx="8407893" cy="4878281"/>
+          </a:xfrm>
+        </p:spPr>
+        <p:txBody>
+          <a:bodyPr>
+            <a:normAutofit/>
+          </a:bodyPr>
+          <a:lstStyle/>
+          <a:p>
+            <a:pPr marL="45720" indent="0">
+              <a:buNone/>
+            </a:pPr>
+            <a:r>
+              <a:rPr lang="pl-PL" sz="1800" dirty="0"/>
+              <a:t>I na koniec widok z góry. Napis „</a:t>
+            </a:r>
+            <a:r>
+              <a:rPr lang="pl-PL" sz="1800" dirty="0" err="1"/>
+              <a:t>Yourscore</a:t>
+            </a:r>
+            <a:r>
+              <a:rPr lang="pl-PL" sz="1800" dirty="0"/>
+              <a:t>: 0” w lewym dolnym rogu ekranu jest przygotowany dla dalszej części projektu. Jak już zrealizujemy funkcjonalność wyścigów, w tym miejscu będzie podliczany wynik gracza</a:t>
+            </a:r>
+            <a:r>
+              <a:rPr lang="pl-PL" sz="1800" dirty="0" smtClean="0"/>
+              <a:t>:</a:t>
+            </a:r>
+          </a:p>
+          <a:p>
+            <a:pPr marL="45720" indent="0">
+              <a:buNone/>
+            </a:pPr>
+            <a:endParaRPr lang="pl-PL" sz="1800" dirty="0" smtClean="0"/>
+          </a:p>
+        </p:txBody>
+      </p:sp>
+      <p:sp>
+        <p:nvSpPr>
+          <p:cNvPr id="2" name="Tytuł 1"/>
+          <p:cNvSpPr>
+            <a:spLocks noGrp="1"/>
+          </p:cNvSpPr>
+          <p:nvPr>
+            <p:ph type="title"/>
+          </p:nvPr>
+        </p:nvSpPr>
+        <p:spPr/>
+        <p:txBody>
+          <a:bodyPr/>
+          <a:lstStyle/>
+          <a:p>
+            <a:r>
+              <a:rPr lang="pl-PL" dirty="0" smtClean="0"/>
+              <a:t>Postęp prac</a:t>
+            </a:r>
+            <a:endParaRPr lang="pl-PL" dirty="0"/>
+          </a:p>
+        </p:txBody>
+      </p:sp>
+      <p:pic>
+        <p:nvPicPr>
+          <p:cNvPr id="5" name="Obraz 4"/>
+          <p:cNvPicPr>
+            <a:picLocks noChangeAspect="1"/>
+          </p:cNvPicPr>
+          <p:nvPr/>
+        </p:nvPicPr>
+        <p:blipFill>
+          <a:blip r:embed="rId2"/>
+          <a:stretch>
+            <a:fillRect/>
+          </a:stretch>
+        </p:blipFill>
+        <p:spPr>
+          <a:xfrm>
+            <a:off x="3707904" y="2924944"/>
+            <a:ext cx="4999804" cy="3384376"/>
+          </a:xfrm>
+          <a:prstGeom prst="rect">
+            <a:avLst/>
+          </a:prstGeom>
+        </p:spPr>
+      </p:pic>
+    </p:spTree>
+    <p:extLst>
+      <p:ext uri="{BB962C8B-B14F-4D97-AF65-F5344CB8AC3E}">
+        <p14:creationId xmlns:p14="http://schemas.microsoft.com/office/powerpoint/2010/main" val="1899094107"/>
+      </p:ext>
+    </p:extLst>
+  </p:cSld>
+  <p:clrMapOvr>
+    <a:masterClrMapping/>
+  </p:clrMapOvr>
+  <p:timing>
+    <p:tnLst>
+      <p:par>
+        <p:cTn id="1" dur="indefinite" restart="never" nodeType="tmRoot"/>
+      </p:par>
+    </p:tnLst>
+  </p:timing>
+</p:sld>
+</file>
+
+<file path=ppt/slides/slide13.xml><?xml version="1.0" encoding="utf-8"?>
+<p:sld xmlns:a="http://schemas.openxmlformats.org/drawingml/2006/main" xmlns:r="http://schemas.openxmlformats.org/officeDocument/2006/relationships" xmlns:p="http://schemas.openxmlformats.org/presentationml/2006/main">
+  <p:cSld>
+    <p:spTree>
+      <p:nvGrpSpPr>
+        <p:cNvPr id="1" name=""/>
+        <p:cNvGrpSpPr/>
+        <p:nvPr/>
+      </p:nvGrpSpPr>
+      <p:grpSpPr>
+        <a:xfrm>
+          <a:off x="0" y="0"/>
+          <a:ext cx="0" cy="0"/>
+          <a:chOff x="0" y="0"/>
+          <a:chExt cx="0" cy="0"/>
+        </a:xfrm>
+      </p:grpSpPr>
+      <p:sp>
+        <p:nvSpPr>
+          <p:cNvPr id="3" name="Symbol zastępczy zawartości 2"/>
+          <p:cNvSpPr>
+            <a:spLocks noGrp="1"/>
+          </p:cNvSpPr>
+          <p:nvPr>
+            <p:ph idx="1"/>
+          </p:nvPr>
+        </p:nvSpPr>
+        <p:spPr>
+          <a:xfrm>
+            <a:off x="380999" y="1719070"/>
+            <a:ext cx="8407893" cy="4878281"/>
+          </a:xfrm>
+        </p:spPr>
+        <p:txBody>
+          <a:bodyPr>
+            <a:normAutofit/>
+          </a:bodyPr>
+          <a:lstStyle/>
+          <a:p>
+            <a:pPr marL="45720" indent="0">
+              <a:buNone/>
+            </a:pPr>
+            <a:endParaRPr lang="pl-PL" sz="1800" dirty="0" smtClean="0"/>
+          </a:p>
+          <a:p>
+            <a:pPr marL="45720" indent="0">
+              <a:buNone/>
+            </a:pPr>
+            <a:r>
+              <a:rPr lang="pl-PL" sz="1800" dirty="0"/>
+              <a:t>Wśród dotychczasowego postępu pracy należy również nadmienić implementację kolizji z terenem. Zderzenie z ziemią, drzewem, lub innym elementem terenu spowoduje przerwanie symulacji i wyświetlenie poniższego ekranu z komunikatem o „końcu gry” i tym oto aspektem kończymy również tą prezentację</a:t>
+            </a:r>
+            <a:r>
+              <a:rPr lang="pl-PL" sz="1800" dirty="0" smtClean="0"/>
+              <a:t>:</a:t>
+            </a:r>
+          </a:p>
+          <a:p>
+            <a:pPr marL="45720" indent="0">
+              <a:buNone/>
+            </a:pPr>
+            <a:endParaRPr lang="pl-PL" sz="1800" dirty="0" smtClean="0"/>
+          </a:p>
+        </p:txBody>
+      </p:sp>
+      <p:sp>
+        <p:nvSpPr>
+          <p:cNvPr id="2" name="Tytuł 1"/>
+          <p:cNvSpPr>
+            <a:spLocks noGrp="1"/>
+          </p:cNvSpPr>
+          <p:nvPr>
+            <p:ph type="title"/>
+          </p:nvPr>
+        </p:nvSpPr>
+        <p:spPr/>
+        <p:txBody>
+          <a:bodyPr/>
+          <a:lstStyle/>
+          <a:p>
+            <a:r>
+              <a:rPr lang="pl-PL" dirty="0" smtClean="0"/>
+              <a:t>Postęp prac</a:t>
+            </a:r>
+            <a:endParaRPr lang="pl-PL" dirty="0"/>
+          </a:p>
+        </p:txBody>
+      </p:sp>
+    </p:spTree>
+    <p:extLst>
+      <p:ext uri="{BB962C8B-B14F-4D97-AF65-F5344CB8AC3E}">
+        <p14:creationId xmlns:p14="http://schemas.microsoft.com/office/powerpoint/2010/main" val="361550357"/>
+      </p:ext>
+    </p:extLst>
+  </p:cSld>
+  <p:clrMapOvr>
+    <a:masterClrMapping/>
+  </p:clrMapOvr>
+  <p:timing>
+    <p:tnLst>
+      <p:par>
+        <p:cTn id="1" dur="indefinite" restart="never" nodeType="tmRoot"/>
+      </p:par>
+    </p:tnLst>
+  </p:timing>
+</p:sld>
+</file>
+
+<file path=ppt/slides/slide14.xml><?xml version="1.0" encoding="utf-8"?>
+<p:sld xmlns:a="http://schemas.openxmlformats.org/drawingml/2006/main" xmlns:r="http://schemas.openxmlformats.org/officeDocument/2006/relationships" xmlns:p="http://schemas.openxmlformats.org/presentationml/2006/main">
+  <p:cSld>
+    <p:spTree>
+      <p:nvGrpSpPr>
+        <p:cNvPr id="1" name=""/>
+        <p:cNvGrpSpPr/>
+        <p:nvPr/>
+      </p:nvGrpSpPr>
+      <p:grpSpPr>
+        <a:xfrm>
+          <a:off x="0" y="0"/>
+          <a:ext cx="0" cy="0"/>
+          <a:chOff x="0" y="0"/>
+          <a:chExt cx="0" cy="0"/>
+        </a:xfrm>
+      </p:grpSpPr>
+      <p:pic>
+        <p:nvPicPr>
+          <p:cNvPr id="6" name="Obraz 5"/>
+          <p:cNvPicPr>
+            <a:picLocks noChangeAspect="1"/>
+          </p:cNvPicPr>
+          <p:nvPr/>
+        </p:nvPicPr>
+        <p:blipFill>
+          <a:blip r:embed="rId2"/>
+          <a:stretch>
+            <a:fillRect/>
+          </a:stretch>
+        </p:blipFill>
+        <p:spPr>
+          <a:xfrm>
+            <a:off x="9262" y="0"/>
+            <a:ext cx="9134737" cy="6858000"/>
+          </a:xfrm>
+          <a:prstGeom prst="rect">
+            <a:avLst/>
+          </a:prstGeom>
+        </p:spPr>
+      </p:pic>
+    </p:spTree>
+    <p:extLst>
+      <p:ext uri="{BB962C8B-B14F-4D97-AF65-F5344CB8AC3E}">
+        <p14:creationId xmlns:p14="http://schemas.microsoft.com/office/powerpoint/2010/main" val="3217514751"/>
       </p:ext>
     </p:extLst>
   </p:cSld>
@@ -4721,11 +5198,7 @@
           <a:p>
             <a:r>
               <a:rPr lang="pl-PL" dirty="0" smtClean="0"/>
-              <a:t>Cele </a:t>
-            </a:r>
-            <a:r>
-              <a:rPr lang="pl-PL" dirty="0" smtClean="0"/>
-              <a:t>projektu</a:t>
+              <a:t>Cele projektu</a:t>
             </a:r>
           </a:p>
           <a:p>
@@ -4749,14 +5222,12 @@
               <a:rPr lang="pl-PL" dirty="0" smtClean="0"/>
               <a:t>wejściowe</a:t>
             </a:r>
-            <a:endParaRPr lang="pl-PL" dirty="0" smtClean="0"/>
           </a:p>
           <a:p>
             <a:r>
               <a:rPr lang="pl-PL" dirty="0" smtClean="0"/>
               <a:t>Postęp prac</a:t>
             </a:r>
-            <a:endParaRPr lang="pl-PL" dirty="0" smtClean="0"/>
           </a:p>
         </p:txBody>
       </p:sp>
@@ -4903,13 +5374,8 @@
             </a:pPr>
             <a:r>
               <a:rPr lang="pl-PL" dirty="0" smtClean="0"/>
-              <a:t>2) symulacji trójwymiarowych</a:t>
-            </a:r>
-            <a:r>
-              <a:rPr lang="pl-PL" dirty="0" smtClean="0"/>
-              <a:t>			</a:t>
-            </a:r>
-            <a:endParaRPr lang="pl-PL" dirty="0" smtClean="0"/>
+              <a:t>2) symulacji trójwymiarowych			</a:t>
+            </a:r>
           </a:p>
           <a:p>
             <a:pPr marL="45720" indent="0">
@@ -5124,7 +5590,6 @@
               <a:rPr lang="pl-PL" sz="1600" dirty="0" smtClean="0"/>
               <a:t>wysokościowej terenu.</a:t>
             </a:r>
-            <a:endParaRPr lang="pl-PL" sz="1600" dirty="0" smtClean="0"/>
           </a:p>
         </p:txBody>
       </p:sp>
@@ -5145,11 +5610,7 @@
           <a:p>
             <a:r>
               <a:rPr lang="pl-PL" dirty="0" smtClean="0"/>
-              <a:t>OPIS </a:t>
-            </a:r>
-            <a:r>
-              <a:rPr lang="pl-PL" dirty="0" smtClean="0"/>
-              <a:t>PROJEKTU</a:t>
+              <a:t>OPIS PROJEKTU</a:t>
             </a:r>
             <a:endParaRPr lang="pl-PL" dirty="0"/>
           </a:p>
@@ -5253,13 +5714,8 @@
           <a:p>
             <a:r>
               <a:rPr lang="pl-PL" sz="1600" dirty="0" smtClean="0"/>
-              <a:t>wykorzystanie silnika </a:t>
-            </a:r>
-            <a:r>
-              <a:rPr lang="pl-PL" sz="1600" dirty="0" smtClean="0"/>
-              <a:t>Unity</a:t>
-            </a:r>
-            <a:endParaRPr lang="pl-PL" sz="1600" dirty="0" smtClean="0"/>
+              <a:t>wykorzystanie silnika Unity</a:t>
+            </a:r>
           </a:p>
           <a:p>
             <a:r>
@@ -5496,7 +5952,6 @@
               <a:rPr lang="pl-PL" dirty="0" smtClean="0"/>
               <a:t>, *.gif</a:t>
             </a:r>
-            <a:endParaRPr lang="pl-PL" dirty="0" smtClean="0"/>
           </a:p>
         </p:txBody>
       </p:sp>
@@ -5654,20 +6109,22 @@
           </a:xfrm>
         </p:spPr>
         <p:txBody>
-          <a:bodyPr/>
-          <a:lstStyle/>
-          <a:p>
-            <a:endParaRPr lang="pl-PL" dirty="0" smtClean="0"/>
-          </a:p>
+          <a:bodyPr>
+            <a:normAutofit/>
+          </a:bodyPr>
+          <a:lstStyle/>
           <a:p>
             <a:pPr marL="45720" indent="0">
               <a:buNone/>
             </a:pPr>
             <a:r>
-              <a:rPr lang="pl-PL" dirty="0" smtClean="0"/>
-              <a:t>Menu startowe umożliwiające wybór mapy, z której ma być wygenerowany teren:</a:t>
-            </a:r>
-            <a:endParaRPr lang="pl-PL" dirty="0" smtClean="0"/>
+              <a:rPr lang="pl-PL" sz="1800" dirty="0" smtClean="0"/>
+              <a:t>Menu </a:t>
+            </a:r>
+            <a:r>
+              <a:rPr lang="pl-PL" sz="1800" dirty="0" smtClean="0"/>
+              <a:t>startowe umożliwiające wybór mapy, z której ma być wygenerowany teren:</a:t>
+            </a:r>
           </a:p>
         </p:txBody>
       </p:sp>
@@ -5710,7 +6167,7 @@
         </p:blipFill>
         <p:spPr>
           <a:xfrm>
-            <a:off x="1115616" y="3231876"/>
+            <a:off x="744871" y="3212976"/>
             <a:ext cx="3096344" cy="3128265"/>
           </a:xfrm>
           <a:prstGeom prst="rect">
@@ -5734,8 +6191,8 @@
         </p:blipFill>
         <p:spPr>
           <a:xfrm>
-            <a:off x="3923928" y="2564904"/>
-            <a:ext cx="4752528" cy="3520699"/>
+            <a:off x="3707904" y="2325852"/>
+            <a:ext cx="4946933" cy="3664715"/>
           </a:xfrm>
           <a:prstGeom prst="rect">
             <a:avLst/>
@@ -5796,20 +6253,22 @@
           </a:xfrm>
         </p:spPr>
         <p:txBody>
-          <a:bodyPr/>
-          <a:lstStyle/>
-          <a:p>
-            <a:endParaRPr lang="pl-PL" dirty="0" smtClean="0"/>
-          </a:p>
+          <a:bodyPr>
+            <a:normAutofit/>
+          </a:bodyPr>
+          <a:lstStyle/>
           <a:p>
             <a:pPr marL="45720" indent="0">
               <a:buNone/>
             </a:pPr>
             <a:r>
-              <a:rPr lang="pl-PL" dirty="0" smtClean="0"/>
-              <a:t>Menu startowe umożliwiające wybór mapy, z której ma być wygenerowany teren:</a:t>
-            </a:r>
-            <a:endParaRPr lang="pl-PL" dirty="0" smtClean="0"/>
+              <a:rPr lang="pl-PL" sz="1800" dirty="0" smtClean="0"/>
+              <a:t>Menu </a:t>
+            </a:r>
+            <a:r>
+              <a:rPr lang="pl-PL" sz="1800" dirty="0" smtClean="0"/>
+              <a:t>startowe umożliwiające wybór mapy, z której ma być wygenerowany teren:</a:t>
+            </a:r>
           </a:p>
         </p:txBody>
       </p:sp>
@@ -5852,7 +6311,7 @@
         </p:blipFill>
         <p:spPr>
           <a:xfrm>
-            <a:off x="3923928" y="2636912"/>
+            <a:off x="3995936" y="2492896"/>
             <a:ext cx="3695700" cy="3733800"/>
           </a:xfrm>
           <a:prstGeom prst="rect">
@@ -5914,28 +6373,30 @@
           </a:xfrm>
         </p:spPr>
         <p:txBody>
-          <a:bodyPr/>
-          <a:lstStyle/>
-          <a:p>
-            <a:endParaRPr lang="pl-PL" dirty="0" smtClean="0"/>
-          </a:p>
+          <a:bodyPr>
+            <a:normAutofit/>
+          </a:bodyPr>
+          <a:lstStyle/>
           <a:p>
             <a:pPr marL="45720" indent="0">
               <a:buNone/>
             </a:pPr>
             <a:r>
-              <a:rPr lang="pl-PL" dirty="0" smtClean="0"/>
-              <a:t>Po naciśnięciu przycisku „Start </a:t>
-            </a:r>
-            <a:r>
-              <a:rPr lang="pl-PL" dirty="0" err="1" smtClean="0"/>
+              <a:rPr lang="pl-PL" sz="1800" dirty="0" smtClean="0"/>
+              <a:t>Po </a:t>
+            </a:r>
+            <a:r>
+              <a:rPr lang="pl-PL" sz="1800" dirty="0" smtClean="0"/>
+              <a:t>naciśnięciu przycisku „Start </a:t>
+            </a:r>
+            <a:r>
+              <a:rPr lang="pl-PL" sz="1800" dirty="0" err="1" smtClean="0"/>
               <a:t>Simulation</a:t>
             </a:r>
             <a:r>
-              <a:rPr lang="pl-PL" dirty="0" smtClean="0"/>
+              <a:rPr lang="pl-PL" sz="1800" dirty="0" smtClean="0"/>
               <a:t>” następuje przekierowanie do kolejnej sceny, w której zaimplementowana jest już właściwa symulacja. Generacja terenu trójwymiarowego jeszcze nie została ukończona, na chwilę obecną z odczytanych danych generujemy płaski teren (o wymiarach zgodnych z wymiarami wczytanej mapy) z nałożoną teksturą:</a:t>
             </a:r>
-            <a:endParaRPr lang="pl-PL" dirty="0" smtClean="0"/>
           </a:p>
         </p:txBody>
       </p:sp>
@@ -5978,8 +6439,8 @@
         </p:blipFill>
         <p:spPr>
           <a:xfrm>
-            <a:off x="2195736" y="4077072"/>
-            <a:ext cx="4774325" cy="2392779"/>
+            <a:off x="2051720" y="3645024"/>
+            <a:ext cx="5367254" cy="2689941"/>
           </a:xfrm>
           <a:prstGeom prst="rect">
             <a:avLst/>

</xml_diff>